<commit_message>
Make plots & updated ReadMe for presentation
</commit_message>
<xml_diff>
--- a/PSPT Data Project Pitch.pptx
+++ b/PSPT Data Project Pitch.pptx
@@ -116,6 +116,11 @@
       </a:defRPr>
     </a:lvl9pPr>
   </p:defaultTextStyle>
+  <p:extLst>
+    <p:ext uri="{EFAFB233-063F-42B5-8137-9DF3F51BA10A}">
+      <p15:sldGuideLst xmlns:p15="http://schemas.microsoft.com/office/powerpoint/2012/main"/>
+    </p:ext>
+  </p:extLst>
 </p:presentation>
 </file>
 
@@ -201,7 +206,7 @@
           <a:p>
             <a:fld id="{93808430-E5F2-A64A-825B-433B5E9EE674}" type="datetimeFigureOut">
               <a:rPr lang="en-US" smtClean="0"/>
-              <a:t>11/7/19</a:t>
+              <a:t>12/2/19</a:t>
             </a:fld>
             <a:endParaRPr lang="en-US"/>
           </a:p>
@@ -783,7 +788,7 @@
             <a:fld id="{B61BEF0D-F0BB-DE4B-95CE-6DB70DBA9567}" type="datetimeFigureOut">
               <a:rPr lang="en-US" dirty="0"/>
               <a:pPr/>
-              <a:t>11/6/19</a:t>
+              <a:t>12/2/19</a:t>
             </a:fld>
             <a:endParaRPr lang="en-US" dirty="0"/>
           </a:p>
@@ -1114,7 +1119,7 @@
             <a:fld id="{B61BEF0D-F0BB-DE4B-95CE-6DB70DBA9567}" type="datetimeFigureOut">
               <a:rPr lang="en-US" dirty="0"/>
               <a:pPr/>
-              <a:t>11/6/19</a:t>
+              <a:t>12/2/19</a:t>
             </a:fld>
             <a:endParaRPr lang="en-US" dirty="0"/>
           </a:p>
@@ -1389,7 +1394,7 @@
             <a:fld id="{B61BEF0D-F0BB-DE4B-95CE-6DB70DBA9567}" type="datetimeFigureOut">
               <a:rPr lang="en-US" dirty="0"/>
               <a:pPr/>
-              <a:t>11/6/19</a:t>
+              <a:t>12/2/19</a:t>
             </a:fld>
             <a:endParaRPr lang="en-US" dirty="0"/>
           </a:p>
@@ -1954,7 +1959,7 @@
             <a:fld id="{B61BEF0D-F0BB-DE4B-95CE-6DB70DBA9567}" type="datetimeFigureOut">
               <a:rPr lang="en-US" dirty="0"/>
               <a:pPr/>
-              <a:t>11/6/19</a:t>
+              <a:t>12/2/19</a:t>
             </a:fld>
             <a:endParaRPr lang="en-US" dirty="0"/>
           </a:p>
@@ -2229,7 +2234,7 @@
             <a:fld id="{B61BEF0D-F0BB-DE4B-95CE-6DB70DBA9567}" type="datetimeFigureOut">
               <a:rPr lang="en-US" dirty="0"/>
               <a:pPr/>
-              <a:t>11/6/19</a:t>
+              <a:t>12/2/19</a:t>
             </a:fld>
             <a:endParaRPr lang="en-US" dirty="0"/>
           </a:p>
@@ -2788,7 +2793,7 @@
             <a:fld id="{B61BEF0D-F0BB-DE4B-95CE-6DB70DBA9567}" type="datetimeFigureOut">
               <a:rPr lang="en-US" dirty="0"/>
               <a:pPr/>
-              <a:t>11/6/19</a:t>
+              <a:t>12/2/19</a:t>
             </a:fld>
             <a:endParaRPr lang="en-US" dirty="0"/>
           </a:p>
@@ -3112,7 +3117,7 @@
             <a:fld id="{B61BEF0D-F0BB-DE4B-95CE-6DB70DBA9567}" type="datetimeFigureOut">
               <a:rPr lang="en-US" dirty="0"/>
               <a:pPr/>
-              <a:t>11/6/19</a:t>
+              <a:t>12/2/19</a:t>
             </a:fld>
             <a:endParaRPr lang="en-US" dirty="0"/>
           </a:p>
@@ -3286,7 +3291,7 @@
             <a:fld id="{B61BEF0D-F0BB-DE4B-95CE-6DB70DBA9567}" type="datetimeFigureOut">
               <a:rPr lang="en-US" dirty="0"/>
               <a:pPr/>
-              <a:t>11/6/19</a:t>
+              <a:t>12/2/19</a:t>
             </a:fld>
             <a:endParaRPr lang="en-US" dirty="0"/>
           </a:p>
@@ -3521,7 +3526,7 @@
             <a:fld id="{B61BEF0D-F0BB-DE4B-95CE-6DB70DBA9567}" type="datetimeFigureOut">
               <a:rPr lang="en-US" dirty="0"/>
               <a:pPr/>
-              <a:t>11/6/19</a:t>
+              <a:t>12/2/19</a:t>
             </a:fld>
             <a:endParaRPr lang="en-US" dirty="0"/>
           </a:p>
@@ -3718,7 +3723,7 @@
             <a:fld id="{B61BEF0D-F0BB-DE4B-95CE-6DB70DBA9567}" type="datetimeFigureOut">
               <a:rPr lang="en-US" dirty="0"/>
               <a:pPr/>
-              <a:t>11/6/19</a:t>
+              <a:t>12/2/19</a:t>
             </a:fld>
             <a:endParaRPr lang="en-US" dirty="0"/>
           </a:p>
@@ -3991,7 +3996,7 @@
             <a:fld id="{B61BEF0D-F0BB-DE4B-95CE-6DB70DBA9567}" type="datetimeFigureOut">
               <a:rPr lang="en-US" dirty="0"/>
               <a:pPr/>
-              <a:t>11/6/19</a:t>
+              <a:t>12/2/19</a:t>
             </a:fld>
             <a:endParaRPr lang="en-US" dirty="0"/>
           </a:p>
@@ -4254,7 +4259,7 @@
             <a:fld id="{B61BEF0D-F0BB-DE4B-95CE-6DB70DBA9567}" type="datetimeFigureOut">
               <a:rPr lang="en-US" dirty="0"/>
               <a:pPr/>
-              <a:t>11/6/19</a:t>
+              <a:t>12/2/19</a:t>
             </a:fld>
             <a:endParaRPr lang="en-US" dirty="0"/>
           </a:p>
@@ -4625,7 +4630,7 @@
             <a:fld id="{B61BEF0D-F0BB-DE4B-95CE-6DB70DBA9567}" type="datetimeFigureOut">
               <a:rPr lang="en-US" dirty="0"/>
               <a:pPr/>
-              <a:t>11/6/19</a:t>
+              <a:t>12/2/19</a:t>
             </a:fld>
             <a:endParaRPr lang="en-US" dirty="0"/>
           </a:p>
@@ -4770,7 +4775,7 @@
             <a:fld id="{B61BEF0D-F0BB-DE4B-95CE-6DB70DBA9567}" type="datetimeFigureOut">
               <a:rPr lang="en-US" dirty="0"/>
               <a:pPr/>
-              <a:t>11/6/19</a:t>
+              <a:t>12/2/19</a:t>
             </a:fld>
             <a:endParaRPr lang="en-US" dirty="0"/>
           </a:p>
@@ -4892,7 +4897,7 @@
             <a:fld id="{B61BEF0D-F0BB-DE4B-95CE-6DB70DBA9567}" type="datetimeFigureOut">
               <a:rPr lang="en-US" dirty="0"/>
               <a:pPr/>
-              <a:t>11/6/19</a:t>
+              <a:t>12/2/19</a:t>
             </a:fld>
             <a:endParaRPr lang="en-US" dirty="0"/>
           </a:p>
@@ -5174,7 +5179,7 @@
             <a:fld id="{B61BEF0D-F0BB-DE4B-95CE-6DB70DBA9567}" type="datetimeFigureOut">
               <a:rPr lang="en-US" dirty="0"/>
               <a:pPr/>
-              <a:t>11/6/19</a:t>
+              <a:t>12/2/19</a:t>
             </a:fld>
             <a:endParaRPr lang="en-US" dirty="0"/>
           </a:p>
@@ -5495,7 +5500,7 @@
             <a:fld id="{B61BEF0D-F0BB-DE4B-95CE-6DB70DBA9567}" type="datetimeFigureOut">
               <a:rPr lang="en-US" dirty="0"/>
               <a:pPr/>
-              <a:t>11/6/19</a:t>
+              <a:t>12/2/19</a:t>
             </a:fld>
             <a:endParaRPr lang="en-US" dirty="0"/>
           </a:p>
@@ -5706,7 +5711,7 @@
             <a:fld id="{B61BEF0D-F0BB-DE4B-95CE-6DB70DBA9567}" type="datetimeFigureOut">
               <a:rPr lang="en-US" dirty="0"/>
               <a:pPr/>
-              <a:t>11/6/19</a:t>
+              <a:t>12/2/19</a:t>
             </a:fld>
             <a:endParaRPr lang="en-US" dirty="0"/>
           </a:p>
@@ -6793,7 +6798,7 @@
         </p:blipFill>
         <p:spPr>
           <a:xfrm>
-            <a:off x="497711" y="463139"/>
+            <a:off x="497711" y="485441"/>
             <a:ext cx="11211359" cy="5890160"/>
           </a:xfrm>
           <a:prstGeom prst="rect">

</xml_diff>